<commit_message>
added user class and updated design report
</commit_message>
<xml_diff>
--- a/Reports/DesignReport.pptx
+++ b/Reports/DesignReport.pptx
@@ -6836,7 +6836,7 @@
         </p:blipFill>
         <p:spPr>
           <a:xfrm>
-            <a:off x="6648771" y="235972"/>
+            <a:off x="7277421" y="235972"/>
             <a:ext cx="4638191" cy="6184255"/>
           </a:xfrm>
           <a:prstGeom prst="rect">
@@ -6871,7 +6871,7 @@
         </p:blipFill>
         <p:spPr>
           <a:xfrm>
-            <a:off x="2058966" y="2491407"/>
+            <a:off x="3876336" y="2491407"/>
             <a:ext cx="2209961" cy="3928820"/>
           </a:xfrm>
           <a:prstGeom prst="rect">

</xml_diff>